<commit_message>
add the content how to sync local Git repository and remote repository
</commit_message>
<xml_diff>
--- a/GitHub介绍.pptx
+++ b/GitHub介绍.pptx
@@ -5,10 +5,10 @@
     <p:sldMasterId id="2147483780" r:id="rId1"/>
   </p:sldMasterIdLst>
   <p:notesMasterIdLst>
-    <p:notesMasterId r:id="rId22"/>
+    <p:notesMasterId r:id="rId25"/>
   </p:notesMasterIdLst>
   <p:handoutMasterIdLst>
-    <p:handoutMasterId r:id="rId23"/>
+    <p:handoutMasterId r:id="rId26"/>
   </p:handoutMasterIdLst>
   <p:sldIdLst>
     <p:sldId id="256" r:id="rId2"/>
@@ -31,6 +31,9 @@
     <p:sldId id="272" r:id="rId19"/>
     <p:sldId id="274" r:id="rId20"/>
     <p:sldId id="275" r:id="rId21"/>
+    <p:sldId id="276" r:id="rId22"/>
+    <p:sldId id="277" r:id="rId23"/>
+    <p:sldId id="278" r:id="rId24"/>
   </p:sldIdLst>
   <p:sldSz cx="9144000" cy="6858000" type="screen4x3"/>
   <p:notesSz cx="6858000" cy="9144000"/>
@@ -215,7 +218,7 @@
             <a:fld id="{45317752-800D-4380-8C25-04301CAD6EFD}" type="datetimeFigureOut">
               <a:rPr lang="zh-CN" altLang="en-US" smtClean="0"/>
               <a:pPr/>
-              <a:t>2015/2/15</a:t>
+              <a:t>2015/3/8</a:t>
             </a:fld>
             <a:endParaRPr lang="zh-CN" altLang="en-US"/>
           </a:p>
@@ -382,7 +385,7 @@
             <a:fld id="{059DB260-D4F8-4671-A3BD-DA3C258AE219}" type="datetimeFigureOut">
               <a:rPr lang="zh-CN" altLang="en-US" smtClean="0"/>
               <a:pPr/>
-              <a:t>2015/2/15</a:t>
+              <a:t>2015/3/8</a:t>
             </a:fld>
             <a:endParaRPr lang="zh-CN" altLang="en-US"/>
           </a:p>
@@ -2060,7 +2063,7 @@
             <a:fld id="{D97CF0C7-272E-49B5-A239-3E04052E0407}" type="datetimeFigureOut">
               <a:rPr lang="en-US" smtClean="0"/>
               <a:pPr/>
-              <a:t>2/15/2015</a:t>
+              <a:t>3/8/2015</a:t>
             </a:fld>
             <a:endParaRPr lang="en-US"/>
           </a:p>
@@ -6260,7 +6263,7 @@
           <a:blip r:embed="rId2">
             <a:extLst>
               <a:ext uri="{28A0092B-C50C-407E-A947-70E740481C1C}">
-                <a14:useLocalDpi xmlns:a14="http://schemas.microsoft.com/office/drawing/2010/main" xmlns="" val="0"/>
+                <a14:useLocalDpi xmlns="" xmlns:a14="http://schemas.microsoft.com/office/drawing/2010/main" val="0"/>
               </a:ext>
             </a:extLst>
           </a:blip>
@@ -6283,14 +6286,14 @@
           </a:ln>
           <a:extLst>
             <a:ext uri="{909E8E84-426E-40DD-AFC4-6F175D3DCCD1}">
-              <a14:hiddenFill xmlns:a14="http://schemas.microsoft.com/office/drawing/2010/main" xmlns="">
+              <a14:hiddenFill xmlns="" xmlns:a14="http://schemas.microsoft.com/office/drawing/2010/main">
                 <a:solidFill>
                   <a:schemeClr val="accent1"/>
                 </a:solidFill>
               </a14:hiddenFill>
             </a:ext>
             <a:ext uri="{91240B29-F687-4F45-9708-019B960494DF}">
-              <a14:hiddenLine xmlns:a14="http://schemas.microsoft.com/office/drawing/2010/main" xmlns="" w="9525">
+              <a14:hiddenLine xmlns="" xmlns:a14="http://schemas.microsoft.com/office/drawing/2010/main" w="9525">
                 <a:solidFill>
                   <a:schemeClr val="tx1"/>
                 </a:solidFill>
@@ -6374,7 +6377,7 @@
     </p:spTree>
     <p:extLst>
       <p:ext uri="{BB962C8B-B14F-4D97-AF65-F5344CB8AC3E}">
-        <p14:creationId xmlns:p14="http://schemas.microsoft.com/office/powerpoint/2010/main" xmlns="" val="4221093007"/>
+        <p14:creationId xmlns="" xmlns:p14="http://schemas.microsoft.com/office/powerpoint/2010/main" val="4221093007"/>
       </p:ext>
     </p:extLst>
   </p:cSld>
@@ -6613,7 +6616,7 @@
           <a:blip r:embed="rId2">
             <a:extLst>
               <a:ext uri="{28A0092B-C50C-407E-A947-70E740481C1C}">
-                <a14:useLocalDpi xmlns:a14="http://schemas.microsoft.com/office/drawing/2010/main" xmlns="" val="0"/>
+                <a14:useLocalDpi xmlns="" xmlns:a14="http://schemas.microsoft.com/office/drawing/2010/main" val="0"/>
               </a:ext>
             </a:extLst>
           </a:blip>
@@ -6636,14 +6639,14 @@
           </a:ln>
           <a:extLst>
             <a:ext uri="{909E8E84-426E-40DD-AFC4-6F175D3DCCD1}">
-              <a14:hiddenFill xmlns:a14="http://schemas.microsoft.com/office/drawing/2010/main" xmlns="">
+              <a14:hiddenFill xmlns="" xmlns:a14="http://schemas.microsoft.com/office/drawing/2010/main">
                 <a:solidFill>
                   <a:schemeClr val="accent1"/>
                 </a:solidFill>
               </a14:hiddenFill>
             </a:ext>
             <a:ext uri="{91240B29-F687-4F45-9708-019B960494DF}">
-              <a14:hiddenLine xmlns:a14="http://schemas.microsoft.com/office/drawing/2010/main" xmlns="" w="9525">
+              <a14:hiddenLine xmlns="" xmlns:a14="http://schemas.microsoft.com/office/drawing/2010/main" w="9525">
                 <a:solidFill>
                   <a:schemeClr val="tx1"/>
                 </a:solidFill>
@@ -6667,7 +6670,7 @@
           <a:blip r:embed="rId3">
             <a:extLst>
               <a:ext uri="{28A0092B-C50C-407E-A947-70E740481C1C}">
-                <a14:useLocalDpi xmlns:a14="http://schemas.microsoft.com/office/drawing/2010/main" xmlns="" val="0"/>
+                <a14:useLocalDpi xmlns="" xmlns:a14="http://schemas.microsoft.com/office/drawing/2010/main" val="0"/>
               </a:ext>
             </a:extLst>
           </a:blip>
@@ -6690,14 +6693,14 @@
           </a:ln>
           <a:extLst>
             <a:ext uri="{909E8E84-426E-40DD-AFC4-6F175D3DCCD1}">
-              <a14:hiddenFill xmlns:a14="http://schemas.microsoft.com/office/drawing/2010/main" xmlns="">
+              <a14:hiddenFill xmlns="" xmlns:a14="http://schemas.microsoft.com/office/drawing/2010/main">
                 <a:solidFill>
                   <a:schemeClr val="accent1"/>
                 </a:solidFill>
               </a14:hiddenFill>
             </a:ext>
             <a:ext uri="{91240B29-F687-4F45-9708-019B960494DF}">
-              <a14:hiddenLine xmlns:a14="http://schemas.microsoft.com/office/drawing/2010/main" xmlns="" w="9525">
+              <a14:hiddenLine xmlns="" xmlns:a14="http://schemas.microsoft.com/office/drawing/2010/main" w="9525">
                 <a:solidFill>
                   <a:schemeClr val="tx1"/>
                 </a:solidFill>
@@ -6798,7 +6801,7 @@
     </p:spTree>
     <p:extLst>
       <p:ext uri="{BB962C8B-B14F-4D97-AF65-F5344CB8AC3E}">
-        <p14:creationId xmlns:p14="http://schemas.microsoft.com/office/powerpoint/2010/main" xmlns="" val="82976313"/>
+        <p14:creationId xmlns="" xmlns:p14="http://schemas.microsoft.com/office/powerpoint/2010/main" val="82976313"/>
       </p:ext>
     </p:extLst>
   </p:cSld>
@@ -6959,7 +6962,7 @@
           <a:blip r:embed="rId2">
             <a:extLst>
               <a:ext uri="{28A0092B-C50C-407E-A947-70E740481C1C}">
-                <a14:useLocalDpi xmlns:a14="http://schemas.microsoft.com/office/drawing/2010/main" xmlns="" val="0"/>
+                <a14:useLocalDpi xmlns="" xmlns:a14="http://schemas.microsoft.com/office/drawing/2010/main" val="0"/>
               </a:ext>
             </a:extLst>
           </a:blip>
@@ -6982,14 +6985,14 @@
           </a:ln>
           <a:extLst>
             <a:ext uri="{909E8E84-426E-40DD-AFC4-6F175D3DCCD1}">
-              <a14:hiddenFill xmlns:a14="http://schemas.microsoft.com/office/drawing/2010/main" xmlns="">
+              <a14:hiddenFill xmlns="" xmlns:a14="http://schemas.microsoft.com/office/drawing/2010/main">
                 <a:solidFill>
                   <a:schemeClr val="accent1"/>
                 </a:solidFill>
               </a14:hiddenFill>
             </a:ext>
             <a:ext uri="{91240B29-F687-4F45-9708-019B960494DF}">
-              <a14:hiddenLine xmlns:a14="http://schemas.microsoft.com/office/drawing/2010/main" xmlns="" w="9525">
+              <a14:hiddenLine xmlns="" xmlns:a14="http://schemas.microsoft.com/office/drawing/2010/main" w="9525">
                 <a:solidFill>
                   <a:schemeClr val="tx1"/>
                 </a:solidFill>
@@ -7013,7 +7016,7 @@
           <a:blip r:embed="rId3">
             <a:extLst>
               <a:ext uri="{28A0092B-C50C-407E-A947-70E740481C1C}">
-                <a14:useLocalDpi xmlns:a14="http://schemas.microsoft.com/office/drawing/2010/main" xmlns="" val="0"/>
+                <a14:useLocalDpi xmlns="" xmlns:a14="http://schemas.microsoft.com/office/drawing/2010/main" val="0"/>
               </a:ext>
             </a:extLst>
           </a:blip>
@@ -7036,14 +7039,14 @@
           </a:ln>
           <a:extLst>
             <a:ext uri="{909E8E84-426E-40DD-AFC4-6F175D3DCCD1}">
-              <a14:hiddenFill xmlns:a14="http://schemas.microsoft.com/office/drawing/2010/main" xmlns="">
+              <a14:hiddenFill xmlns="" xmlns:a14="http://schemas.microsoft.com/office/drawing/2010/main">
                 <a:solidFill>
                   <a:schemeClr val="accent1"/>
                 </a:solidFill>
               </a14:hiddenFill>
             </a:ext>
             <a:ext uri="{91240B29-F687-4F45-9708-019B960494DF}">
-              <a14:hiddenLine xmlns:a14="http://schemas.microsoft.com/office/drawing/2010/main" xmlns="" w="9525">
+              <a14:hiddenLine xmlns="" xmlns:a14="http://schemas.microsoft.com/office/drawing/2010/main" w="9525">
                 <a:solidFill>
                   <a:schemeClr val="tx1"/>
                 </a:solidFill>
@@ -7058,7 +7061,7 @@
     </p:spTree>
     <p:extLst>
       <p:ext uri="{BB962C8B-B14F-4D97-AF65-F5344CB8AC3E}">
-        <p14:creationId xmlns:p14="http://schemas.microsoft.com/office/powerpoint/2010/main" xmlns="" val="1633240983"/>
+        <p14:creationId xmlns="" xmlns:p14="http://schemas.microsoft.com/office/powerpoint/2010/main" val="1633240983"/>
       </p:ext>
     </p:extLst>
   </p:cSld>
@@ -7173,7 +7176,7 @@
           <a:blip r:embed="rId2">
             <a:extLst>
               <a:ext uri="{28A0092B-C50C-407E-A947-70E740481C1C}">
-                <a14:useLocalDpi xmlns:a14="http://schemas.microsoft.com/office/drawing/2010/main" xmlns="" val="0"/>
+                <a14:useLocalDpi xmlns="" xmlns:a14="http://schemas.microsoft.com/office/drawing/2010/main" val="0"/>
               </a:ext>
             </a:extLst>
           </a:blip>
@@ -7196,14 +7199,14 @@
           </a:ln>
           <a:extLst>
             <a:ext uri="{909E8E84-426E-40DD-AFC4-6F175D3DCCD1}">
-              <a14:hiddenFill xmlns:a14="http://schemas.microsoft.com/office/drawing/2010/main" xmlns="">
+              <a14:hiddenFill xmlns="" xmlns:a14="http://schemas.microsoft.com/office/drawing/2010/main">
                 <a:solidFill>
                   <a:schemeClr val="accent1"/>
                 </a:solidFill>
               </a14:hiddenFill>
             </a:ext>
             <a:ext uri="{91240B29-F687-4F45-9708-019B960494DF}">
-              <a14:hiddenLine xmlns:a14="http://schemas.microsoft.com/office/drawing/2010/main" xmlns="" w="9525">
+              <a14:hiddenLine xmlns="" xmlns:a14="http://schemas.microsoft.com/office/drawing/2010/main" w="9525">
                 <a:solidFill>
                   <a:schemeClr val="tx1"/>
                 </a:solidFill>
@@ -7218,7 +7221,7 @@
     </p:spTree>
     <p:extLst>
       <p:ext uri="{BB962C8B-B14F-4D97-AF65-F5344CB8AC3E}">
-        <p14:creationId xmlns:p14="http://schemas.microsoft.com/office/powerpoint/2010/main" xmlns="" val="586778666"/>
+        <p14:creationId xmlns="" xmlns:p14="http://schemas.microsoft.com/office/powerpoint/2010/main" val="586778666"/>
       </p:ext>
     </p:extLst>
   </p:cSld>
@@ -7343,7 +7346,7 @@
           <a:blip r:embed="rId2">
             <a:extLst>
               <a:ext uri="{28A0092B-C50C-407E-A947-70E740481C1C}">
-                <a14:useLocalDpi xmlns:a14="http://schemas.microsoft.com/office/drawing/2010/main" xmlns="" val="0"/>
+                <a14:useLocalDpi xmlns="" xmlns:a14="http://schemas.microsoft.com/office/drawing/2010/main" val="0"/>
               </a:ext>
             </a:extLst>
           </a:blip>
@@ -7366,14 +7369,14 @@
           </a:ln>
           <a:extLst>
             <a:ext uri="{909E8E84-426E-40DD-AFC4-6F175D3DCCD1}">
-              <a14:hiddenFill xmlns:a14="http://schemas.microsoft.com/office/drawing/2010/main" xmlns="">
+              <a14:hiddenFill xmlns="" xmlns:a14="http://schemas.microsoft.com/office/drawing/2010/main">
                 <a:solidFill>
                   <a:schemeClr val="accent1"/>
                 </a:solidFill>
               </a14:hiddenFill>
             </a:ext>
             <a:ext uri="{91240B29-F687-4F45-9708-019B960494DF}">
-              <a14:hiddenLine xmlns:a14="http://schemas.microsoft.com/office/drawing/2010/main" xmlns="" w="9525">
+              <a14:hiddenLine xmlns="" xmlns:a14="http://schemas.microsoft.com/office/drawing/2010/main" w="9525">
                 <a:solidFill>
                   <a:schemeClr val="tx1"/>
                 </a:solidFill>
@@ -7388,7 +7391,7 @@
     </p:spTree>
     <p:extLst>
       <p:ext uri="{BB962C8B-B14F-4D97-AF65-F5344CB8AC3E}">
-        <p14:creationId xmlns:p14="http://schemas.microsoft.com/office/powerpoint/2010/main" xmlns="" val="1988265929"/>
+        <p14:creationId xmlns="" xmlns:p14="http://schemas.microsoft.com/office/powerpoint/2010/main" val="1988265929"/>
       </p:ext>
     </p:extLst>
   </p:cSld>
@@ -7465,7 +7468,7 @@
             <a:fld id="{D97CF0C7-272E-49B5-A239-3E04052E0407}" type="datetimeFigureOut">
               <a:rPr lang="en-US" smtClean="0"/>
               <a:pPr/>
-              <a:t>2/15/2015</a:t>
+              <a:t>3/8/2015</a:t>
             </a:fld>
             <a:endParaRPr lang="en-US"/>
           </a:p>
@@ -7573,11 +7576,7 @@
           <a:p>
             <a:r>
               <a:rPr lang="en-US" altLang="zh-CN" sz="1200" dirty="0" smtClean="0"/>
-              <a:t>S</a:t>
-            </a:r>
-            <a:r>
-              <a:rPr lang="en-US" altLang="zh-CN" sz="1200" dirty="0" smtClean="0"/>
-              <a:t>tep 1: Generate private key and public key</a:t>
+              <a:t>Step 1: Generate private key and public key</a:t>
             </a:r>
           </a:p>
           <a:p>
@@ -7741,7 +7740,7 @@
             <a:fld id="{D97CF0C7-272E-49B5-A239-3E04052E0407}" type="datetimeFigureOut">
               <a:rPr lang="en-US" smtClean="0"/>
               <a:pPr/>
-              <a:t>2/15/2015</a:t>
+              <a:t>3/8/2015</a:t>
             </a:fld>
             <a:endParaRPr lang="en-US"/>
           </a:p>
@@ -7884,11 +7883,7 @@
           <a:p>
             <a:r>
               <a:rPr lang="en-US" altLang="zh-CN" sz="1200" dirty="0" smtClean="0"/>
-              <a:t>S</a:t>
-            </a:r>
-            <a:r>
-              <a:rPr lang="en-US" altLang="zh-CN" sz="1200" dirty="0" smtClean="0"/>
-              <a:t>tep 2: open the </a:t>
+              <a:t>Step 2: open the </a:t>
             </a:r>
             <a:r>
               <a:rPr lang="en-US" altLang="zh-CN" sz="1200" dirty="0" err="1" smtClean="0"/>
@@ -7971,11 +7966,7 @@
           <a:p>
             <a:r>
               <a:rPr lang="en-US" altLang="zh-CN" sz="1200" dirty="0" smtClean="0"/>
-              <a:t>S</a:t>
-            </a:r>
-            <a:r>
-              <a:rPr lang="en-US" altLang="zh-CN" sz="1200" dirty="0" smtClean="0"/>
-              <a:t>tep 3: Copy the public key to GitHub.com</a:t>
+              <a:t>Step 3: Copy the public key to GitHub.com</a:t>
             </a:r>
           </a:p>
         </p:txBody>
@@ -8129,7 +8120,7 @@
             <a:fld id="{D97CF0C7-272E-49B5-A239-3E04052E0407}" type="datetimeFigureOut">
               <a:rPr lang="en-US" smtClean="0"/>
               <a:pPr/>
-              <a:t>2/15/2015</a:t>
+              <a:t>3/8/2015</a:t>
             </a:fld>
             <a:endParaRPr lang="en-US"/>
           </a:p>
@@ -8204,11 +8195,7 @@
           <a:p>
             <a:r>
               <a:rPr lang="en-US" altLang="zh-CN" sz="1200" dirty="0" smtClean="0"/>
-              <a:t>S</a:t>
-            </a:r>
-            <a:r>
-              <a:rPr lang="en-US" altLang="zh-CN" sz="1200" dirty="0" smtClean="0"/>
-              <a:t>tep 4: Get your private key file by command in </a:t>
+              <a:t>Step 4: Get your private key file by command in </a:t>
             </a:r>
             <a:r>
               <a:rPr lang="en-US" altLang="zh-CN" sz="1200" dirty="0" err="1" smtClean="0"/>
@@ -8301,15 +8288,7 @@
                   <a:srgbClr val="000099"/>
                 </a:solidFill>
               </a:rPr>
-              <a:t>c</a:t>
-            </a:r>
-            <a:r>
-              <a:rPr lang="en-US" altLang="zh-CN" sz="1200" dirty="0" err="1" smtClean="0">
-                <a:solidFill>
-                  <a:srgbClr val="000099"/>
-                </a:solidFill>
-              </a:rPr>
-              <a:t>d</a:t>
+              <a:t>cd</a:t>
             </a:r>
             <a:r>
               <a:rPr lang="en-US" altLang="zh-CN" sz="1200" dirty="0" smtClean="0">
@@ -8344,15 +8323,7 @@
                   <a:srgbClr val="000099"/>
                 </a:solidFill>
               </a:rPr>
-              <a:t>l</a:t>
-            </a:r>
-            <a:r>
-              <a:rPr lang="en-US" altLang="zh-CN" sz="1200" dirty="0" err="1" smtClean="0">
-                <a:solidFill>
-                  <a:srgbClr val="000099"/>
-                </a:solidFill>
-              </a:rPr>
-              <a:t>i</a:t>
+              <a:t>li</a:t>
             </a:r>
             <a:endParaRPr lang="en-US" altLang="zh-CN" sz="1200" dirty="0" smtClean="0">
               <a:solidFill>
@@ -8428,11 +8399,7 @@
           <a:p>
             <a:r>
               <a:rPr lang="en-US" altLang="zh-CN" sz="1200" dirty="0" smtClean="0"/>
-              <a:t>S</a:t>
-            </a:r>
-            <a:r>
-              <a:rPr lang="en-US" altLang="zh-CN" sz="1200" dirty="0" smtClean="0"/>
-              <a:t>tep 5: Set </a:t>
+              <a:t>Step 5: Set </a:t>
             </a:r>
             <a:r>
               <a:rPr lang="en-US" altLang="zh-CN" sz="1200" dirty="0" err="1" smtClean="0"/>
@@ -8554,7 +8521,7 @@
             <a:fld id="{D97CF0C7-272E-49B5-A239-3E04052E0407}" type="datetimeFigureOut">
               <a:rPr lang="en-US" smtClean="0"/>
               <a:pPr/>
-              <a:t>2/15/2015</a:t>
+              <a:t>3/8/2015</a:t>
             </a:fld>
             <a:endParaRPr lang="en-US"/>
           </a:p>
@@ -8629,11 +8596,7 @@
           <a:p>
             <a:r>
               <a:rPr lang="en-US" altLang="zh-CN" sz="1200" dirty="0" smtClean="0"/>
-              <a:t>S</a:t>
-            </a:r>
-            <a:r>
-              <a:rPr lang="en-US" altLang="zh-CN" sz="1200" dirty="0" smtClean="0"/>
-              <a:t>tep 5: test communicate with </a:t>
+              <a:t>Step 5: test communicate with </a:t>
             </a:r>
             <a:r>
               <a:rPr lang="en-US" altLang="zh-CN" sz="1200" dirty="0" err="1" smtClean="0"/>
@@ -8872,15 +8835,7 @@
                   <a:srgbClr val="FF0000"/>
                 </a:solidFill>
               </a:rPr>
-              <a:t>Till </a:t>
-            </a:r>
-            <a:r>
-              <a:rPr lang="en-US" altLang="zh-CN" sz="1200" b="1" dirty="0" smtClean="0">
-                <a:solidFill>
-                  <a:srgbClr val="FF0000"/>
-                </a:solidFill>
-              </a:rPr>
-              <a:t>now, tested pass.</a:t>
+              <a:t>Till now, tested pass.</a:t>
             </a:r>
             <a:endParaRPr lang="zh-CN" altLang="en-US" sz="1200" b="1" dirty="0" smtClean="0">
               <a:solidFill>
@@ -9025,7 +8980,7 @@
             <a:fld id="{D97CF0C7-272E-49B5-A239-3E04052E0407}" type="datetimeFigureOut">
               <a:rPr lang="en-US" smtClean="0"/>
               <a:pPr/>
-              <a:t>2/15/2015</a:t>
+              <a:t>3/8/2015</a:t>
             </a:fld>
             <a:endParaRPr lang="en-US"/>
           </a:p>
@@ -9463,7 +9418,7 @@
             <a:fld id="{D97CF0C7-272E-49B5-A239-3E04052E0407}" type="datetimeFigureOut">
               <a:rPr lang="en-US" smtClean="0"/>
               <a:pPr/>
-              <a:t>2/15/2015</a:t>
+              <a:t>3/8/2015</a:t>
             </a:fld>
             <a:endParaRPr lang="en-US"/>
           </a:p>
@@ -9669,6 +9624,1188 @@
   <p:clrMapOvr>
     <a:masterClrMapping/>
   </p:clrMapOvr>
+</p:sld>
+</file>
+
+<file path=ppt/slides/slide21.xml><?xml version="1.0" encoding="utf-8"?>
+<p:sld xmlns:a="http://schemas.openxmlformats.org/drawingml/2006/main" xmlns:r="http://schemas.openxmlformats.org/officeDocument/2006/relationships" xmlns:p="http://schemas.openxmlformats.org/presentationml/2006/main">
+  <p:cSld>
+    <p:spTree>
+      <p:nvGrpSpPr>
+        <p:cNvPr id="1" name=""/>
+        <p:cNvGrpSpPr/>
+        <p:nvPr/>
+      </p:nvGrpSpPr>
+      <p:grpSpPr>
+        <a:xfrm>
+          <a:off x="0" y="0"/>
+          <a:ext cx="0" cy="0"/>
+          <a:chOff x="0" y="0"/>
+          <a:chExt cx="0" cy="0"/>
+        </a:xfrm>
+      </p:grpSpPr>
+      <p:sp>
+        <p:nvSpPr>
+          <p:cNvPr id="2" name="标题 1"/>
+          <p:cNvSpPr>
+            <a:spLocks noGrp="1"/>
+          </p:cNvSpPr>
+          <p:nvPr>
+            <p:ph type="title"/>
+          </p:nvPr>
+        </p:nvSpPr>
+        <p:spPr/>
+        <p:txBody>
+          <a:bodyPr>
+            <a:normAutofit fontScale="90000"/>
+          </a:bodyPr>
+          <a:lstStyle/>
+          <a:p>
+            <a:r>
+              <a:rPr lang="zh-CN" altLang="en-US" dirty="0" smtClean="0"/>
+              <a:t>新建</a:t>
+            </a:r>
+            <a:r>
+              <a:rPr lang="zh-CN" altLang="en-US" dirty="0" smtClean="0"/>
+              <a:t>代码仓库，同步到本地</a:t>
+            </a:r>
+            <a:endParaRPr lang="zh-CN" altLang="en-US" dirty="0"/>
+          </a:p>
+        </p:txBody>
+      </p:sp>
+      <p:sp>
+        <p:nvSpPr>
+          <p:cNvPr id="3" name="内容占位符 2"/>
+          <p:cNvSpPr>
+            <a:spLocks noGrp="1"/>
+          </p:cNvSpPr>
+          <p:nvPr>
+            <p:ph sz="quarter" idx="1"/>
+          </p:nvPr>
+        </p:nvSpPr>
+        <p:spPr/>
+        <p:txBody>
+          <a:bodyPr>
+            <a:normAutofit/>
+          </a:bodyPr>
+          <a:lstStyle/>
+          <a:p>
+            <a:r>
+              <a:rPr lang="en-US" altLang="zh-CN" sz="1000" dirty="0" smtClean="0"/>
+              <a:t>1. </a:t>
+            </a:r>
+            <a:r>
+              <a:rPr lang="zh-CN" altLang="en-US" sz="1000" dirty="0" smtClean="0"/>
+              <a:t>在</a:t>
+            </a:r>
+            <a:r>
+              <a:rPr lang="en-US" altLang="zh-CN" sz="1000" dirty="0" err="1" smtClean="0"/>
+              <a:t>GitHub</a:t>
+            </a:r>
+            <a:r>
+              <a:rPr lang="zh-CN" altLang="en-US" sz="1000" dirty="0" smtClean="0"/>
+              <a:t> 创建一个自己的代码仓库</a:t>
+            </a:r>
+            <a:endParaRPr lang="en-US" altLang="zh-CN" sz="1000" dirty="0" smtClean="0"/>
+          </a:p>
+          <a:p>
+            <a:pPr>
+              <a:buNone/>
+            </a:pPr>
+            <a:r>
+              <a:rPr lang="zh-CN" altLang="en-US" sz="1000" dirty="0" smtClean="0"/>
+              <a:t>          建议一个代码仓库为一个项目</a:t>
+            </a:r>
+            <a:endParaRPr lang="en-US" altLang="zh-CN" sz="1000" dirty="0" smtClean="0"/>
+          </a:p>
+          <a:p>
+            <a:r>
+              <a:rPr lang="en-US" altLang="zh-CN" sz="1000" dirty="0" smtClean="0"/>
+              <a:t>2. </a:t>
+            </a:r>
+            <a:r>
+              <a:rPr lang="zh-CN" altLang="en-US" sz="1000" dirty="0" smtClean="0"/>
+              <a:t>使用</a:t>
+            </a:r>
+            <a:r>
+              <a:rPr lang="en-US" altLang="zh-CN" sz="1000" dirty="0" err="1" smtClean="0"/>
+              <a:t>Git</a:t>
+            </a:r>
+            <a:r>
+              <a:rPr lang="en-US" altLang="zh-CN" sz="1000" dirty="0" smtClean="0"/>
+              <a:t> Clone</a:t>
+            </a:r>
+            <a:r>
+              <a:rPr lang="zh-CN" altLang="en-US" sz="1000" dirty="0" smtClean="0"/>
+              <a:t> </a:t>
+            </a:r>
+            <a:r>
+              <a:rPr lang="en-US" altLang="zh-CN" sz="1000" dirty="0" smtClean="0"/>
+              <a:t> </a:t>
+            </a:r>
+            <a:endParaRPr lang="zh-CN" altLang="en-US" sz="1000" dirty="0"/>
+          </a:p>
+        </p:txBody>
+      </p:sp>
+      <p:sp>
+        <p:nvSpPr>
+          <p:cNvPr id="4" name="日期占位符 3"/>
+          <p:cNvSpPr>
+            <a:spLocks noGrp="1"/>
+          </p:cNvSpPr>
+          <p:nvPr>
+            <p:ph type="dt" sz="half" idx="14"/>
+          </p:nvPr>
+        </p:nvSpPr>
+        <p:spPr/>
+        <p:txBody>
+          <a:bodyPr/>
+          <a:lstStyle/>
+          <a:p>
+            <a:fld id="{D97CF0C7-272E-49B5-A239-3E04052E0407}" type="datetimeFigureOut">
+              <a:rPr lang="en-US" smtClean="0"/>
+              <a:pPr/>
+              <a:t>3/8/2015</a:t>
+            </a:fld>
+            <a:endParaRPr lang="en-US"/>
+          </a:p>
+        </p:txBody>
+      </p:sp>
+      <p:sp>
+        <p:nvSpPr>
+          <p:cNvPr id="5" name="灯片编号占位符 4"/>
+          <p:cNvSpPr>
+            <a:spLocks noGrp="1"/>
+          </p:cNvSpPr>
+          <p:nvPr>
+            <p:ph type="sldNum" sz="quarter" idx="15"/>
+          </p:nvPr>
+        </p:nvSpPr>
+        <p:spPr/>
+        <p:txBody>
+          <a:bodyPr/>
+          <a:lstStyle/>
+          <a:p>
+            <a:fld id="{D9BF818D-EE60-4A79-893A-D9EF4109A5AB}" type="slidenum">
+              <a:rPr lang="en-US" smtClean="0"/>
+              <a:pPr/>
+              <a:t>21</a:t>
+            </a:fld>
+            <a:endParaRPr lang="en-US"/>
+          </a:p>
+        </p:txBody>
+      </p:sp>
+      <p:sp>
+        <p:nvSpPr>
+          <p:cNvPr id="6" name="页脚占位符 5"/>
+          <p:cNvSpPr>
+            <a:spLocks noGrp="1"/>
+          </p:cNvSpPr>
+          <p:nvPr>
+            <p:ph type="ftr" sz="quarter" idx="16"/>
+          </p:nvPr>
+        </p:nvSpPr>
+        <p:spPr/>
+        <p:txBody>
+          <a:bodyPr/>
+          <a:lstStyle/>
+          <a:p>
+            <a:endParaRPr lang="en-US"/>
+          </a:p>
+        </p:txBody>
+      </p:sp>
+      <p:pic>
+        <p:nvPicPr>
+          <p:cNvPr id="1026" name="Picture 2"/>
+          <p:cNvPicPr>
+            <a:picLocks noChangeAspect="1" noChangeArrowheads="1"/>
+          </p:cNvPicPr>
+          <p:nvPr/>
+        </p:nvPicPr>
+        <p:blipFill>
+          <a:blip r:embed="rId2"/>
+          <a:srcRect/>
+          <a:stretch>
+            <a:fillRect/>
+          </a:stretch>
+        </p:blipFill>
+        <p:spPr bwMode="auto">
+          <a:xfrm>
+            <a:off x="3000364" y="1928802"/>
+            <a:ext cx="5286375" cy="3733800"/>
+          </a:xfrm>
+          <a:prstGeom prst="rect">
+            <a:avLst/>
+          </a:prstGeom>
+          <a:noFill/>
+          <a:ln w="9525">
+            <a:noFill/>
+            <a:miter lim="800000"/>
+            <a:headEnd/>
+            <a:tailEnd/>
+          </a:ln>
+          <a:effectLst/>
+        </p:spPr>
+      </p:pic>
+      <p:pic>
+        <p:nvPicPr>
+          <p:cNvPr id="1027" name="Picture 3"/>
+          <p:cNvPicPr>
+            <a:picLocks noChangeAspect="1" noChangeArrowheads="1"/>
+          </p:cNvPicPr>
+          <p:nvPr/>
+        </p:nvPicPr>
+        <p:blipFill>
+          <a:blip r:embed="rId3"/>
+          <a:srcRect/>
+          <a:stretch>
+            <a:fillRect/>
+          </a:stretch>
+        </p:blipFill>
+        <p:spPr bwMode="auto">
+          <a:xfrm>
+            <a:off x="3571868" y="571480"/>
+            <a:ext cx="2447925" cy="1266825"/>
+          </a:xfrm>
+          <a:prstGeom prst="rect">
+            <a:avLst/>
+          </a:prstGeom>
+          <a:noFill/>
+          <a:ln w="9525">
+            <a:noFill/>
+            <a:miter lim="800000"/>
+            <a:headEnd/>
+            <a:tailEnd/>
+          </a:ln>
+          <a:effectLst/>
+        </p:spPr>
+      </p:pic>
+      <p:sp>
+        <p:nvSpPr>
+          <p:cNvPr id="9" name="TextBox 8"/>
+          <p:cNvSpPr txBox="1"/>
+          <p:nvPr/>
+        </p:nvSpPr>
+        <p:spPr>
+          <a:xfrm>
+            <a:off x="357158" y="1714488"/>
+            <a:ext cx="2500330" cy="1754326"/>
+          </a:xfrm>
+          <a:prstGeom prst="rect">
+            <a:avLst/>
+          </a:prstGeom>
+          <a:solidFill>
+            <a:schemeClr val="bg2">
+              <a:lumMod val="90000"/>
+            </a:schemeClr>
+          </a:solidFill>
+        </p:spPr>
+        <p:txBody>
+          <a:bodyPr wrap="square" rtlCol="0">
+            <a:spAutoFit/>
+          </a:bodyPr>
+          <a:lstStyle/>
+          <a:p>
+            <a:r>
+              <a:rPr lang="en-US" sz="1200" dirty="0" smtClean="0">
+                <a:solidFill>
+                  <a:srgbClr val="000099"/>
+                </a:solidFill>
+              </a:rPr>
+              <a:t>This section talks about how to clone a </a:t>
+            </a:r>
+            <a:r>
+              <a:rPr lang="en-US" sz="1200" dirty="0" err="1" smtClean="0">
+                <a:solidFill>
+                  <a:srgbClr val="000099"/>
+                </a:solidFill>
+              </a:rPr>
+              <a:t>git</a:t>
+            </a:r>
+            <a:r>
+              <a:rPr lang="en-US" sz="1200" dirty="0" smtClean="0">
+                <a:solidFill>
+                  <a:srgbClr val="000099"/>
+                </a:solidFill>
+              </a:rPr>
+              <a:t> repository from an existing repository. </a:t>
+            </a:r>
+            <a:endParaRPr lang="en-US" sz="1200" dirty="0" smtClean="0">
+              <a:solidFill>
+                <a:srgbClr val="000099"/>
+              </a:solidFill>
+            </a:endParaRPr>
+          </a:p>
+          <a:p>
+            <a:endParaRPr lang="en-US" sz="1200" dirty="0" smtClean="0">
+              <a:solidFill>
+                <a:srgbClr val="000099"/>
+              </a:solidFill>
+            </a:endParaRPr>
+          </a:p>
+          <a:p>
+            <a:r>
+              <a:rPr lang="en-US" sz="1200" dirty="0" smtClean="0">
+                <a:solidFill>
+                  <a:srgbClr val="000099"/>
+                </a:solidFill>
+              </a:rPr>
+              <a:t>Cloning </a:t>
+            </a:r>
+            <a:r>
+              <a:rPr lang="en-US" sz="1200" dirty="0" smtClean="0">
+                <a:solidFill>
+                  <a:srgbClr val="000099"/>
+                </a:solidFill>
+              </a:rPr>
+              <a:t>a </a:t>
+            </a:r>
+            <a:r>
+              <a:rPr lang="en-US" sz="1200" dirty="0" err="1" smtClean="0">
+                <a:solidFill>
+                  <a:srgbClr val="000099"/>
+                </a:solidFill>
+              </a:rPr>
+              <a:t>git</a:t>
+            </a:r>
+            <a:r>
+              <a:rPr lang="en-US" sz="1200" dirty="0" smtClean="0">
+                <a:solidFill>
+                  <a:srgbClr val="000099"/>
+                </a:solidFill>
+              </a:rPr>
+              <a:t> repository is very simple. At an empty directory, just use the explorer context menu and select </a:t>
+            </a:r>
+            <a:r>
+              <a:rPr lang="en-US" sz="1200" dirty="0" err="1" smtClean="0">
+                <a:solidFill>
+                  <a:srgbClr val="000099"/>
+                </a:solidFill>
+              </a:rPr>
+              <a:t>Git</a:t>
+            </a:r>
+            <a:r>
+              <a:rPr lang="en-US" sz="1200" dirty="0" smtClean="0">
+                <a:solidFill>
+                  <a:srgbClr val="000099"/>
+                </a:solidFill>
+              </a:rPr>
+              <a:t> Clone... . </a:t>
+            </a:r>
+          </a:p>
+          <a:p>
+            <a:endParaRPr lang="zh-CN" altLang="en-US" sz="1200" dirty="0">
+              <a:solidFill>
+                <a:srgbClr val="000099"/>
+              </a:solidFill>
+            </a:endParaRPr>
+          </a:p>
+        </p:txBody>
+      </p:sp>
+    </p:spTree>
+  </p:cSld>
+  <p:clrMapOvr>
+    <a:masterClrMapping/>
+  </p:clrMapOvr>
+</p:sld>
+</file>
+
+<file path=ppt/slides/slide22.xml><?xml version="1.0" encoding="utf-8"?>
+<p:sld xmlns:a="http://schemas.openxmlformats.org/drawingml/2006/main" xmlns:r="http://schemas.openxmlformats.org/officeDocument/2006/relationships" xmlns:p="http://schemas.openxmlformats.org/presentationml/2006/main">
+  <p:cSld>
+    <p:spTree>
+      <p:nvGrpSpPr>
+        <p:cNvPr id="1" name=""/>
+        <p:cNvGrpSpPr/>
+        <p:nvPr/>
+      </p:nvGrpSpPr>
+      <p:grpSpPr>
+        <a:xfrm>
+          <a:off x="0" y="0"/>
+          <a:ext cx="0" cy="0"/>
+          <a:chOff x="0" y="0"/>
+          <a:chExt cx="0" cy="0"/>
+        </a:xfrm>
+      </p:grpSpPr>
+      <p:sp>
+        <p:nvSpPr>
+          <p:cNvPr id="2" name="标题 1"/>
+          <p:cNvSpPr>
+            <a:spLocks noGrp="1"/>
+          </p:cNvSpPr>
+          <p:nvPr>
+            <p:ph type="title"/>
+          </p:nvPr>
+        </p:nvSpPr>
+        <p:spPr/>
+        <p:txBody>
+          <a:bodyPr>
+            <a:normAutofit fontScale="90000"/>
+          </a:bodyPr>
+          <a:lstStyle/>
+          <a:p>
+            <a:r>
+              <a:rPr lang="zh-CN" altLang="en-US" dirty="0" smtClean="0"/>
+              <a:t>同步本地代码到远程仓库</a:t>
+            </a:r>
+            <a:endParaRPr lang="zh-CN" altLang="en-US" dirty="0"/>
+          </a:p>
+        </p:txBody>
+      </p:sp>
+      <p:sp>
+        <p:nvSpPr>
+          <p:cNvPr id="3" name="内容占位符 2"/>
+          <p:cNvSpPr>
+            <a:spLocks noGrp="1"/>
+          </p:cNvSpPr>
+          <p:nvPr>
+            <p:ph sz="quarter" idx="1"/>
+          </p:nvPr>
+        </p:nvSpPr>
+        <p:spPr/>
+        <p:txBody>
+          <a:bodyPr>
+            <a:normAutofit/>
+          </a:bodyPr>
+          <a:lstStyle/>
+          <a:p>
+            <a:r>
+              <a:rPr lang="zh-CN" altLang="en-US" sz="1400" dirty="0" smtClean="0"/>
+              <a:t>下载了最新的代码之后，可能会修改，然后如何同步到远程仓库</a:t>
+            </a:r>
+            <a:r>
+              <a:rPr lang="en-US" altLang="zh-CN" sz="1400" dirty="0" smtClean="0"/>
+              <a:t>,</a:t>
+            </a:r>
+            <a:r>
+              <a:rPr lang="zh-CN" altLang="en-US" sz="1400" dirty="0" smtClean="0"/>
+              <a:t>下面</a:t>
+            </a:r>
+            <a:r>
+              <a:rPr lang="zh-CN" altLang="en-US" sz="1400" dirty="0" smtClean="0"/>
+              <a:t>是步骤：</a:t>
+            </a:r>
+            <a:endParaRPr lang="zh-CN" altLang="en-US" sz="1400" dirty="0"/>
+          </a:p>
+        </p:txBody>
+      </p:sp>
+      <p:sp>
+        <p:nvSpPr>
+          <p:cNvPr id="4" name="日期占位符 3"/>
+          <p:cNvSpPr>
+            <a:spLocks noGrp="1"/>
+          </p:cNvSpPr>
+          <p:nvPr>
+            <p:ph type="dt" sz="half" idx="14"/>
+          </p:nvPr>
+        </p:nvSpPr>
+        <p:spPr/>
+        <p:txBody>
+          <a:bodyPr/>
+          <a:lstStyle/>
+          <a:p>
+            <a:fld id="{D97CF0C7-272E-49B5-A239-3E04052E0407}" type="datetimeFigureOut">
+              <a:rPr lang="en-US" smtClean="0"/>
+              <a:pPr/>
+              <a:t>3/8/2015</a:t>
+            </a:fld>
+            <a:endParaRPr lang="en-US"/>
+          </a:p>
+        </p:txBody>
+      </p:sp>
+      <p:sp>
+        <p:nvSpPr>
+          <p:cNvPr id="5" name="灯片编号占位符 4"/>
+          <p:cNvSpPr>
+            <a:spLocks noGrp="1"/>
+          </p:cNvSpPr>
+          <p:nvPr>
+            <p:ph type="sldNum" sz="quarter" idx="15"/>
+          </p:nvPr>
+        </p:nvSpPr>
+        <p:spPr/>
+        <p:txBody>
+          <a:bodyPr/>
+          <a:lstStyle/>
+          <a:p>
+            <a:fld id="{D9BF818D-EE60-4A79-893A-D9EF4109A5AB}" type="slidenum">
+              <a:rPr lang="en-US" smtClean="0"/>
+              <a:pPr/>
+              <a:t>22</a:t>
+            </a:fld>
+            <a:endParaRPr lang="en-US"/>
+          </a:p>
+        </p:txBody>
+      </p:sp>
+      <p:sp>
+        <p:nvSpPr>
+          <p:cNvPr id="6" name="页脚占位符 5"/>
+          <p:cNvSpPr>
+            <a:spLocks noGrp="1"/>
+          </p:cNvSpPr>
+          <p:nvPr>
+            <p:ph type="ftr" sz="quarter" idx="16"/>
+          </p:nvPr>
+        </p:nvSpPr>
+        <p:spPr/>
+        <p:txBody>
+          <a:bodyPr/>
+          <a:lstStyle/>
+          <a:p>
+            <a:endParaRPr lang="en-US"/>
+          </a:p>
+        </p:txBody>
+      </p:sp>
+      <p:pic>
+        <p:nvPicPr>
+          <p:cNvPr id="2050" name="Picture 2"/>
+          <p:cNvPicPr>
+            <a:picLocks noChangeAspect="1" noChangeArrowheads="1"/>
+          </p:cNvPicPr>
+          <p:nvPr/>
+        </p:nvPicPr>
+        <p:blipFill>
+          <a:blip r:embed="rId2"/>
+          <a:srcRect/>
+          <a:stretch>
+            <a:fillRect/>
+          </a:stretch>
+        </p:blipFill>
+        <p:spPr bwMode="auto">
+          <a:xfrm>
+            <a:off x="3643306" y="1142984"/>
+            <a:ext cx="5048250" cy="2847975"/>
+          </a:xfrm>
+          <a:prstGeom prst="rect">
+            <a:avLst/>
+          </a:prstGeom>
+          <a:noFill/>
+          <a:ln w="9525">
+            <a:noFill/>
+            <a:miter lim="800000"/>
+            <a:headEnd/>
+            <a:tailEnd/>
+          </a:ln>
+          <a:effectLst/>
+        </p:spPr>
+      </p:pic>
+      <p:sp>
+        <p:nvSpPr>
+          <p:cNvPr id="8" name="TextBox 7"/>
+          <p:cNvSpPr txBox="1"/>
+          <p:nvPr/>
+        </p:nvSpPr>
+        <p:spPr>
+          <a:xfrm>
+            <a:off x="500034" y="1285860"/>
+            <a:ext cx="1919115" cy="307777"/>
+          </a:xfrm>
+          <a:prstGeom prst="rect">
+            <a:avLst/>
+          </a:prstGeom>
+          <a:noFill/>
+        </p:spPr>
+        <p:txBody>
+          <a:bodyPr wrap="none" rtlCol="0">
+            <a:spAutoFit/>
+          </a:bodyPr>
+          <a:lstStyle/>
+          <a:p>
+            <a:r>
+              <a:rPr lang="en-US" altLang="zh-CN" sz="1400" dirty="0" smtClean="0">
+                <a:solidFill>
+                  <a:srgbClr val="000099"/>
+                </a:solidFill>
+              </a:rPr>
+              <a:t>1.</a:t>
+            </a:r>
+            <a:r>
+              <a:rPr lang="zh-CN" altLang="en-US" sz="1400" dirty="0" smtClean="0">
+                <a:solidFill>
+                  <a:srgbClr val="000099"/>
+                </a:solidFill>
+              </a:rPr>
+              <a:t> </a:t>
+            </a:r>
+            <a:r>
+              <a:rPr lang="en-US" altLang="zh-CN" sz="1400" dirty="0" err="1" smtClean="0">
+                <a:solidFill>
+                  <a:srgbClr val="000099"/>
+                </a:solidFill>
+              </a:rPr>
+              <a:t>TortoiseGit</a:t>
+            </a:r>
+            <a:r>
+              <a:rPr lang="en-US" altLang="zh-CN" sz="1400" dirty="0" smtClean="0">
+                <a:solidFill>
+                  <a:srgbClr val="000099"/>
+                </a:solidFill>
+              </a:rPr>
+              <a:t>-&gt;Push</a:t>
+            </a:r>
+            <a:endParaRPr lang="zh-CN" altLang="en-US" sz="1400" dirty="0">
+              <a:solidFill>
+                <a:srgbClr val="000099"/>
+              </a:solidFill>
+            </a:endParaRPr>
+          </a:p>
+        </p:txBody>
+      </p:sp>
+      <p:pic>
+        <p:nvPicPr>
+          <p:cNvPr id="2051" name="Picture 3"/>
+          <p:cNvPicPr>
+            <a:picLocks noChangeAspect="1" noChangeArrowheads="1"/>
+          </p:cNvPicPr>
+          <p:nvPr/>
+        </p:nvPicPr>
+        <p:blipFill>
+          <a:blip r:embed="rId3"/>
+          <a:srcRect/>
+          <a:stretch>
+            <a:fillRect/>
+          </a:stretch>
+        </p:blipFill>
+        <p:spPr bwMode="auto">
+          <a:xfrm>
+            <a:off x="214282" y="2214554"/>
+            <a:ext cx="4286280" cy="4294991"/>
+          </a:xfrm>
+          <a:prstGeom prst="rect">
+            <a:avLst/>
+          </a:prstGeom>
+          <a:noFill/>
+          <a:ln w="9525">
+            <a:noFill/>
+            <a:miter lim="800000"/>
+            <a:headEnd/>
+            <a:tailEnd/>
+          </a:ln>
+          <a:effectLst/>
+        </p:spPr>
+      </p:pic>
+      <p:sp>
+        <p:nvSpPr>
+          <p:cNvPr id="10" name="TextBox 9"/>
+          <p:cNvSpPr txBox="1"/>
+          <p:nvPr/>
+        </p:nvSpPr>
+        <p:spPr>
+          <a:xfrm>
+            <a:off x="571472" y="1643050"/>
+            <a:ext cx="1101584" cy="307777"/>
+          </a:xfrm>
+          <a:prstGeom prst="rect">
+            <a:avLst/>
+          </a:prstGeom>
+          <a:noFill/>
+        </p:spPr>
+        <p:txBody>
+          <a:bodyPr wrap="none" rtlCol="0">
+            <a:spAutoFit/>
+          </a:bodyPr>
+          <a:lstStyle/>
+          <a:p>
+            <a:r>
+              <a:rPr lang="en-US" altLang="zh-CN" sz="1400" dirty="0" smtClean="0">
+                <a:solidFill>
+                  <a:srgbClr val="000099"/>
+                </a:solidFill>
+              </a:rPr>
+              <a:t>2</a:t>
+            </a:r>
+            <a:r>
+              <a:rPr lang="en-US" altLang="zh-CN" sz="1400" dirty="0" smtClean="0">
+                <a:solidFill>
+                  <a:srgbClr val="000099"/>
+                </a:solidFill>
+              </a:rPr>
+              <a:t>.</a:t>
+            </a:r>
+            <a:r>
+              <a:rPr lang="zh-CN" altLang="en-US" sz="1400" dirty="0" smtClean="0">
+                <a:solidFill>
+                  <a:srgbClr val="000099"/>
+                </a:solidFill>
+              </a:rPr>
+              <a:t> 配置如下</a:t>
+            </a:r>
+            <a:endParaRPr lang="zh-CN" altLang="en-US" sz="1400" dirty="0">
+              <a:solidFill>
+                <a:srgbClr val="000099"/>
+              </a:solidFill>
+            </a:endParaRPr>
+          </a:p>
+        </p:txBody>
+      </p:sp>
+    </p:spTree>
+  </p:cSld>
+  <p:clrMapOvr>
+    <a:masterClrMapping/>
+  </p:clrMapOvr>
+</p:sld>
+</file>
+
+<file path=ppt/slides/slide23.xml><?xml version="1.0" encoding="utf-8"?>
+<p:sld xmlns:a="http://schemas.openxmlformats.org/drawingml/2006/main" xmlns:r="http://schemas.openxmlformats.org/officeDocument/2006/relationships" xmlns:p="http://schemas.openxmlformats.org/presentationml/2006/main">
+  <p:cSld>
+    <p:spTree>
+      <p:nvGrpSpPr>
+        <p:cNvPr id="1" name=""/>
+        <p:cNvGrpSpPr/>
+        <p:nvPr/>
+      </p:nvGrpSpPr>
+      <p:grpSpPr>
+        <a:xfrm>
+          <a:off x="0" y="0"/>
+          <a:ext cx="0" cy="0"/>
+          <a:chOff x="0" y="0"/>
+          <a:chExt cx="0" cy="0"/>
+        </a:xfrm>
+      </p:grpSpPr>
+      <p:sp>
+        <p:nvSpPr>
+          <p:cNvPr id="2" name="标题 1"/>
+          <p:cNvSpPr>
+            <a:spLocks noGrp="1"/>
+          </p:cNvSpPr>
+          <p:nvPr>
+            <p:ph type="title"/>
+          </p:nvPr>
+        </p:nvSpPr>
+        <p:spPr/>
+        <p:txBody>
+          <a:bodyPr>
+            <a:normAutofit fontScale="90000"/>
+          </a:bodyPr>
+          <a:lstStyle/>
+          <a:p>
+            <a:r>
+              <a:rPr lang="zh-CN" altLang="en-US" dirty="0" smtClean="0"/>
+              <a:t>同步本地代码到远程仓库</a:t>
+            </a:r>
+            <a:endParaRPr lang="zh-CN" altLang="en-US" dirty="0"/>
+          </a:p>
+        </p:txBody>
+      </p:sp>
+      <p:sp>
+        <p:nvSpPr>
+          <p:cNvPr id="4" name="日期占位符 3"/>
+          <p:cNvSpPr>
+            <a:spLocks noGrp="1"/>
+          </p:cNvSpPr>
+          <p:nvPr>
+            <p:ph type="dt" sz="half" idx="14"/>
+          </p:nvPr>
+        </p:nvSpPr>
+        <p:spPr/>
+        <p:txBody>
+          <a:bodyPr/>
+          <a:lstStyle/>
+          <a:p>
+            <a:fld id="{D97CF0C7-272E-49B5-A239-3E04052E0407}" type="datetimeFigureOut">
+              <a:rPr lang="en-US" smtClean="0"/>
+              <a:pPr/>
+              <a:t>3/8/2015</a:t>
+            </a:fld>
+            <a:endParaRPr lang="en-US"/>
+          </a:p>
+        </p:txBody>
+      </p:sp>
+      <p:sp>
+        <p:nvSpPr>
+          <p:cNvPr id="5" name="灯片编号占位符 4"/>
+          <p:cNvSpPr>
+            <a:spLocks noGrp="1"/>
+          </p:cNvSpPr>
+          <p:nvPr>
+            <p:ph type="sldNum" sz="quarter" idx="15"/>
+          </p:nvPr>
+        </p:nvSpPr>
+        <p:spPr/>
+        <p:txBody>
+          <a:bodyPr/>
+          <a:lstStyle/>
+          <a:p>
+            <a:fld id="{D9BF818D-EE60-4A79-893A-D9EF4109A5AB}" type="slidenum">
+              <a:rPr lang="en-US" smtClean="0"/>
+              <a:pPr/>
+              <a:t>23</a:t>
+            </a:fld>
+            <a:endParaRPr lang="en-US"/>
+          </a:p>
+        </p:txBody>
+      </p:sp>
+      <p:sp>
+        <p:nvSpPr>
+          <p:cNvPr id="6" name="页脚占位符 5"/>
+          <p:cNvSpPr>
+            <a:spLocks noGrp="1"/>
+          </p:cNvSpPr>
+          <p:nvPr>
+            <p:ph type="ftr" sz="quarter" idx="16"/>
+          </p:nvPr>
+        </p:nvSpPr>
+        <p:spPr/>
+        <p:txBody>
+          <a:bodyPr/>
+          <a:lstStyle/>
+          <a:p>
+            <a:endParaRPr lang="en-US"/>
+          </a:p>
+        </p:txBody>
+      </p:sp>
+      <p:sp>
+        <p:nvSpPr>
+          <p:cNvPr id="8" name="TextBox 7"/>
+          <p:cNvSpPr txBox="1"/>
+          <p:nvPr/>
+        </p:nvSpPr>
+        <p:spPr>
+          <a:xfrm>
+            <a:off x="500034" y="642918"/>
+            <a:ext cx="3461204" cy="307777"/>
+          </a:xfrm>
+          <a:prstGeom prst="rect">
+            <a:avLst/>
+          </a:prstGeom>
+          <a:noFill/>
+        </p:spPr>
+        <p:txBody>
+          <a:bodyPr wrap="none" rtlCol="0">
+            <a:spAutoFit/>
+          </a:bodyPr>
+          <a:lstStyle/>
+          <a:p>
+            <a:r>
+              <a:rPr lang="zh-CN" altLang="en-US" sz="1400" dirty="0" smtClean="0">
+                <a:solidFill>
+                  <a:srgbClr val="000099"/>
+                </a:solidFill>
+              </a:rPr>
+              <a:t>提交</a:t>
+            </a:r>
+            <a:r>
+              <a:rPr lang="en-US" altLang="zh-CN" sz="1400" dirty="0" smtClean="0">
+                <a:solidFill>
+                  <a:srgbClr val="000099"/>
+                </a:solidFill>
+              </a:rPr>
+              <a:t>push</a:t>
+            </a:r>
+            <a:r>
+              <a:rPr lang="zh-CN" altLang="en-US" sz="1400" dirty="0" smtClean="0">
+                <a:solidFill>
+                  <a:srgbClr val="000099"/>
+                </a:solidFill>
+              </a:rPr>
+              <a:t>代码失败，提示如下，如何解决</a:t>
+            </a:r>
+            <a:endParaRPr lang="zh-CN" altLang="en-US" sz="1400" dirty="0">
+              <a:solidFill>
+                <a:srgbClr val="000099"/>
+              </a:solidFill>
+            </a:endParaRPr>
+          </a:p>
+        </p:txBody>
+      </p:sp>
+      <p:pic>
+        <p:nvPicPr>
+          <p:cNvPr id="3074" name="Picture 2"/>
+          <p:cNvPicPr>
+            <a:picLocks noChangeAspect="1" noChangeArrowheads="1"/>
+          </p:cNvPicPr>
+          <p:nvPr/>
+        </p:nvPicPr>
+        <p:blipFill>
+          <a:blip r:embed="rId2"/>
+          <a:srcRect/>
+          <a:stretch>
+            <a:fillRect/>
+          </a:stretch>
+        </p:blipFill>
+        <p:spPr bwMode="auto">
+          <a:xfrm>
+            <a:off x="3643306" y="928670"/>
+            <a:ext cx="5143536" cy="3381958"/>
+          </a:xfrm>
+          <a:prstGeom prst="rect">
+            <a:avLst/>
+          </a:prstGeom>
+          <a:noFill/>
+          <a:ln w="9525">
+            <a:noFill/>
+            <a:miter lim="800000"/>
+            <a:headEnd/>
+            <a:tailEnd/>
+          </a:ln>
+          <a:effectLst/>
+        </p:spPr>
+      </p:pic>
+      <p:sp>
+        <p:nvSpPr>
+          <p:cNvPr id="12" name="TextBox 11"/>
+          <p:cNvSpPr txBox="1"/>
+          <p:nvPr/>
+        </p:nvSpPr>
+        <p:spPr>
+          <a:xfrm>
+            <a:off x="428596" y="1142984"/>
+            <a:ext cx="2000264" cy="553998"/>
+          </a:xfrm>
+          <a:prstGeom prst="rect">
+            <a:avLst/>
+          </a:prstGeom>
+          <a:solidFill>
+            <a:srgbClr val="FFFF00"/>
+          </a:solidFill>
+        </p:spPr>
+        <p:txBody>
+          <a:bodyPr wrap="square" rtlCol="0">
+            <a:spAutoFit/>
+          </a:bodyPr>
+          <a:lstStyle/>
+          <a:p>
+            <a:r>
+              <a:rPr lang="en-US" altLang="zh-CN" sz="1000" dirty="0" smtClean="0"/>
+              <a:t>1. </a:t>
+            </a:r>
+            <a:r>
+              <a:rPr lang="zh-CN" altLang="en-US" sz="1000" dirty="0" smtClean="0"/>
+              <a:t>先</a:t>
+            </a:r>
+            <a:r>
+              <a:rPr lang="zh-CN" altLang="en-US" sz="1000" dirty="0" smtClean="0"/>
+              <a:t>备份你修改的文件</a:t>
+            </a:r>
+            <a:endParaRPr lang="en-US" altLang="zh-CN" sz="1000" dirty="0" smtClean="0"/>
+          </a:p>
+          <a:p>
+            <a:r>
+              <a:rPr lang="en-US" altLang="zh-CN" sz="1000" dirty="0" smtClean="0"/>
+              <a:t>2. </a:t>
+            </a:r>
+            <a:r>
+              <a:rPr lang="zh-CN" altLang="en-US" sz="1000" dirty="0" smtClean="0"/>
+              <a:t>点击</a:t>
+            </a:r>
+            <a:r>
+              <a:rPr lang="en-US" altLang="zh-CN" sz="1000" dirty="0" smtClean="0"/>
+              <a:t>pull</a:t>
+            </a:r>
+            <a:r>
+              <a:rPr lang="zh-CN" altLang="en-US" sz="1000" dirty="0" smtClean="0"/>
+              <a:t>从服务器拉最新的代码下来</a:t>
+            </a:r>
+            <a:endParaRPr lang="zh-CN" altLang="en-US" sz="1000" dirty="0"/>
+          </a:p>
+        </p:txBody>
+      </p:sp>
+      <p:sp>
+        <p:nvSpPr>
+          <p:cNvPr id="13" name="矩形 12"/>
+          <p:cNvSpPr/>
+          <p:nvPr/>
+        </p:nvSpPr>
+        <p:spPr>
+          <a:xfrm>
+            <a:off x="214282" y="1643050"/>
+            <a:ext cx="3143272" cy="769441"/>
+          </a:xfrm>
+          <a:prstGeom prst="rect">
+            <a:avLst/>
+          </a:prstGeom>
+        </p:spPr>
+        <p:txBody>
+          <a:bodyPr wrap="square">
+            <a:spAutoFit/>
+          </a:bodyPr>
+          <a:lstStyle/>
+          <a:p>
+            <a:r>
+              <a:rPr lang="en-US" sz="1100" dirty="0" smtClean="0"/>
+              <a:t>Pull will merge remote branch change to local branch which tracked with remote branch. Fetch just get change from remote branch and never merge. </a:t>
+            </a:r>
+            <a:endParaRPr lang="en-US" sz="1100" dirty="0"/>
+          </a:p>
+        </p:txBody>
+      </p:sp>
+      <p:pic>
+        <p:nvPicPr>
+          <p:cNvPr id="3075" name="Picture 3"/>
+          <p:cNvPicPr>
+            <a:picLocks noChangeAspect="1" noChangeArrowheads="1"/>
+          </p:cNvPicPr>
+          <p:nvPr/>
+        </p:nvPicPr>
+        <p:blipFill>
+          <a:blip r:embed="rId3"/>
+          <a:srcRect/>
+          <a:stretch>
+            <a:fillRect/>
+          </a:stretch>
+        </p:blipFill>
+        <p:spPr bwMode="auto">
+          <a:xfrm>
+            <a:off x="214283" y="3048000"/>
+            <a:ext cx="3571900" cy="2818067"/>
+          </a:xfrm>
+          <a:prstGeom prst="rect">
+            <a:avLst/>
+          </a:prstGeom>
+          <a:noFill/>
+          <a:ln w="9525">
+            <a:noFill/>
+            <a:miter lim="800000"/>
+            <a:headEnd/>
+            <a:tailEnd/>
+          </a:ln>
+          <a:effectLst/>
+        </p:spPr>
+      </p:pic>
+      <p:sp>
+        <p:nvSpPr>
+          <p:cNvPr id="15" name="TextBox 14"/>
+          <p:cNvSpPr txBox="1"/>
+          <p:nvPr/>
+        </p:nvSpPr>
+        <p:spPr>
+          <a:xfrm>
+            <a:off x="428596" y="2643182"/>
+            <a:ext cx="1857388" cy="261610"/>
+          </a:xfrm>
+          <a:prstGeom prst="rect">
+            <a:avLst/>
+          </a:prstGeom>
+          <a:solidFill>
+            <a:srgbClr val="FFFF00"/>
+          </a:solidFill>
+        </p:spPr>
+        <p:txBody>
+          <a:bodyPr wrap="square" rtlCol="0">
+            <a:spAutoFit/>
+          </a:bodyPr>
+          <a:lstStyle/>
+          <a:p>
+            <a:r>
+              <a:rPr lang="en-US" altLang="zh-CN" sz="1100" dirty="0" smtClean="0"/>
+              <a:t>2. Click “ok”</a:t>
+            </a:r>
+            <a:endParaRPr lang="zh-CN" altLang="en-US" sz="1100" dirty="0"/>
+          </a:p>
+        </p:txBody>
+      </p:sp>
+      <p:sp>
+        <p:nvSpPr>
+          <p:cNvPr id="16" name="TextBox 15"/>
+          <p:cNvSpPr txBox="1"/>
+          <p:nvPr/>
+        </p:nvSpPr>
+        <p:spPr>
+          <a:xfrm>
+            <a:off x="4071934" y="4500570"/>
+            <a:ext cx="3879588" cy="261610"/>
+          </a:xfrm>
+          <a:prstGeom prst="rect">
+            <a:avLst/>
+          </a:prstGeom>
+          <a:solidFill>
+            <a:srgbClr val="FFFF00"/>
+          </a:solidFill>
+        </p:spPr>
+        <p:txBody>
+          <a:bodyPr wrap="none" rtlCol="0">
+            <a:spAutoFit/>
+          </a:bodyPr>
+          <a:lstStyle/>
+          <a:p>
+            <a:r>
+              <a:rPr lang="en-US" altLang="zh-CN" sz="1100" dirty="0" smtClean="0"/>
+              <a:t>3.</a:t>
+            </a:r>
+            <a:r>
+              <a:rPr lang="zh-CN" altLang="en-US" sz="1100" dirty="0" smtClean="0"/>
+              <a:t>重新把备份的文件拷贝回去，重新</a:t>
+            </a:r>
+            <a:r>
+              <a:rPr lang="en-US" altLang="zh-CN" sz="1100" dirty="0" smtClean="0"/>
+              <a:t>submit</a:t>
+            </a:r>
+            <a:r>
+              <a:rPr lang="zh-CN" altLang="en-US" sz="1100" dirty="0" smtClean="0"/>
+              <a:t> </a:t>
+            </a:r>
+            <a:r>
+              <a:rPr lang="en-US" altLang="zh-CN" sz="1100" dirty="0" smtClean="0"/>
+              <a:t>-</a:t>
+            </a:r>
+            <a:r>
+              <a:rPr lang="en-US" altLang="zh-CN" sz="1100" dirty="0" smtClean="0">
+                <a:sym typeface="Wingdings" pitchFamily="2" charset="2"/>
+              </a:rPr>
+              <a:t> </a:t>
+            </a:r>
+            <a:r>
+              <a:rPr lang="zh-CN" altLang="en-US" sz="1100" dirty="0" smtClean="0"/>
+              <a:t>重新</a:t>
+            </a:r>
+            <a:r>
+              <a:rPr lang="en-US" altLang="zh-CN" sz="1100" dirty="0" smtClean="0"/>
+              <a:t>push</a:t>
+            </a:r>
+            <a:r>
+              <a:rPr lang="zh-CN" altLang="en-US" sz="1100" dirty="0" smtClean="0"/>
+              <a:t>到</a:t>
+            </a:r>
+            <a:endParaRPr lang="zh-CN" altLang="en-US" sz="1100" dirty="0"/>
+          </a:p>
+        </p:txBody>
+      </p:sp>
+      <p:pic>
+        <p:nvPicPr>
+          <p:cNvPr id="3076" name="Picture 4"/>
+          <p:cNvPicPr>
+            <a:picLocks noChangeAspect="1" noChangeArrowheads="1"/>
+          </p:cNvPicPr>
+          <p:nvPr/>
+        </p:nvPicPr>
+        <p:blipFill>
+          <a:blip r:embed="rId4"/>
+          <a:srcRect/>
+          <a:stretch>
+            <a:fillRect/>
+          </a:stretch>
+        </p:blipFill>
+        <p:spPr bwMode="auto">
+          <a:xfrm>
+            <a:off x="3929058" y="4872708"/>
+            <a:ext cx="2276468" cy="1985292"/>
+          </a:xfrm>
+          <a:prstGeom prst="rect">
+            <a:avLst/>
+          </a:prstGeom>
+          <a:noFill/>
+          <a:ln w="9525">
+            <a:noFill/>
+            <a:miter lim="800000"/>
+            <a:headEnd/>
+            <a:tailEnd/>
+          </a:ln>
+          <a:effectLst/>
+        </p:spPr>
+      </p:pic>
+    </p:spTree>
+  </p:cSld>
+  <p:clrMapOvr>
+    <a:masterClrMapping/>
+  </p:clrMapOvr>
+  <p:timing>
+    <p:tnLst>
+      <p:par>
+        <p:cTn id="1" dur="indefinite" restart="never" nodeType="tmRoot"/>
+      </p:par>
+    </p:tnLst>
+  </p:timing>
 </p:sld>
 </file>
 
@@ -11102,7 +12239,7 @@
           <a:blip r:embed="rId3">
             <a:extLst>
               <a:ext uri="{28A0092B-C50C-407E-A947-70E740481C1C}">
-                <a14:useLocalDpi xmlns:a14="http://schemas.microsoft.com/office/drawing/2010/main" xmlns="" val="0"/>
+                <a14:useLocalDpi xmlns="" xmlns:a14="http://schemas.microsoft.com/office/drawing/2010/main" val="0"/>
               </a:ext>
             </a:extLst>
           </a:blip>
@@ -11125,14 +12262,14 @@
           </a:ln>
           <a:extLst>
             <a:ext uri="{909E8E84-426E-40DD-AFC4-6F175D3DCCD1}">
-              <a14:hiddenFill xmlns:a14="http://schemas.microsoft.com/office/drawing/2010/main" xmlns="">
+              <a14:hiddenFill xmlns="" xmlns:a14="http://schemas.microsoft.com/office/drawing/2010/main">
                 <a:solidFill>
                   <a:schemeClr val="accent1"/>
                 </a:solidFill>
               </a14:hiddenFill>
             </a:ext>
             <a:ext uri="{91240B29-F687-4F45-9708-019B960494DF}">
-              <a14:hiddenLine xmlns:a14="http://schemas.microsoft.com/office/drawing/2010/main" xmlns="" w="9525">
+              <a14:hiddenLine xmlns="" xmlns:a14="http://schemas.microsoft.com/office/drawing/2010/main" w="9525">
                 <a:solidFill>
                   <a:schemeClr val="tx1"/>
                 </a:solidFill>
@@ -11156,7 +12293,7 @@
           <a:blip r:embed="rId4">
             <a:extLst>
               <a:ext uri="{28A0092B-C50C-407E-A947-70E740481C1C}">
-                <a14:useLocalDpi xmlns:a14="http://schemas.microsoft.com/office/drawing/2010/main" xmlns="" val="0"/>
+                <a14:useLocalDpi xmlns="" xmlns:a14="http://schemas.microsoft.com/office/drawing/2010/main" val="0"/>
               </a:ext>
             </a:extLst>
           </a:blip>
@@ -11179,14 +12316,14 @@
           </a:ln>
           <a:extLst>
             <a:ext uri="{909E8E84-426E-40DD-AFC4-6F175D3DCCD1}">
-              <a14:hiddenFill xmlns:a14="http://schemas.microsoft.com/office/drawing/2010/main" xmlns="">
+              <a14:hiddenFill xmlns="" xmlns:a14="http://schemas.microsoft.com/office/drawing/2010/main">
                 <a:solidFill>
                   <a:schemeClr val="accent1"/>
                 </a:solidFill>
               </a14:hiddenFill>
             </a:ext>
             <a:ext uri="{91240B29-F687-4F45-9708-019B960494DF}">
-              <a14:hiddenLine xmlns:a14="http://schemas.microsoft.com/office/drawing/2010/main" xmlns="" w="9525">
+              <a14:hiddenLine xmlns="" xmlns:a14="http://schemas.microsoft.com/office/drawing/2010/main" w="9525">
                 <a:solidFill>
                   <a:schemeClr val="tx1"/>
                 </a:solidFill>
@@ -11257,7 +12394,7 @@
     </p:spTree>
     <p:extLst>
       <p:ext uri="{BB962C8B-B14F-4D97-AF65-F5344CB8AC3E}">
-        <p14:creationId xmlns:p14="http://schemas.microsoft.com/office/powerpoint/2010/main" xmlns="" val="174489219"/>
+        <p14:creationId xmlns="" xmlns:p14="http://schemas.microsoft.com/office/powerpoint/2010/main" val="174489219"/>
       </p:ext>
     </p:extLst>
   </p:cSld>
@@ -11687,7 +12824,7 @@
             <p:ph sz="quarter" idx="1"/>
             <p:extLst>
               <p:ext uri="{D42A27DB-BD31-4B8C-83A1-F6EECF244321}">
-                <p14:modId xmlns:p14="http://schemas.microsoft.com/office/powerpoint/2010/main" xmlns="" val="378322105"/>
+                <p14:modId xmlns="" xmlns:p14="http://schemas.microsoft.com/office/powerpoint/2010/main" val="378322105"/>
               </p:ext>
             </p:extLst>
           </p:nvPr>
@@ -12106,7 +13243,7 @@
           <a:blip r:embed="rId2">
             <a:extLst>
               <a:ext uri="{28A0092B-C50C-407E-A947-70E740481C1C}">
-                <a14:useLocalDpi xmlns:a14="http://schemas.microsoft.com/office/drawing/2010/main" xmlns="" val="0"/>
+                <a14:useLocalDpi xmlns="" xmlns:a14="http://schemas.microsoft.com/office/drawing/2010/main" val="0"/>
               </a:ext>
             </a:extLst>
           </a:blip>
@@ -12129,14 +13266,14 @@
           </a:ln>
           <a:extLst>
             <a:ext uri="{909E8E84-426E-40DD-AFC4-6F175D3DCCD1}">
-              <a14:hiddenFill xmlns:a14="http://schemas.microsoft.com/office/drawing/2010/main" xmlns="">
+              <a14:hiddenFill xmlns="" xmlns:a14="http://schemas.microsoft.com/office/drawing/2010/main">
                 <a:solidFill>
                   <a:schemeClr val="accent1"/>
                 </a:solidFill>
               </a14:hiddenFill>
             </a:ext>
             <a:ext uri="{91240B29-F687-4F45-9708-019B960494DF}">
-              <a14:hiddenLine xmlns:a14="http://schemas.microsoft.com/office/drawing/2010/main" xmlns="" w="9525">
+              <a14:hiddenLine xmlns="" xmlns:a14="http://schemas.microsoft.com/office/drawing/2010/main" w="9525">
                 <a:solidFill>
                   <a:schemeClr val="tx1"/>
                 </a:solidFill>
@@ -12160,7 +13297,7 @@
           <a:blip r:embed="rId3">
             <a:extLst>
               <a:ext uri="{28A0092B-C50C-407E-A947-70E740481C1C}">
-                <a14:useLocalDpi xmlns:a14="http://schemas.microsoft.com/office/drawing/2010/main" xmlns="" val="0"/>
+                <a14:useLocalDpi xmlns="" xmlns:a14="http://schemas.microsoft.com/office/drawing/2010/main" val="0"/>
               </a:ext>
             </a:extLst>
           </a:blip>
@@ -12183,14 +13320,14 @@
           </a:ln>
           <a:extLst>
             <a:ext uri="{909E8E84-426E-40DD-AFC4-6F175D3DCCD1}">
-              <a14:hiddenFill xmlns:a14="http://schemas.microsoft.com/office/drawing/2010/main" xmlns="">
+              <a14:hiddenFill xmlns="" xmlns:a14="http://schemas.microsoft.com/office/drawing/2010/main">
                 <a:solidFill>
                   <a:schemeClr val="accent1"/>
                 </a:solidFill>
               </a14:hiddenFill>
             </a:ext>
             <a:ext uri="{91240B29-F687-4F45-9708-019B960494DF}">
-              <a14:hiddenLine xmlns:a14="http://schemas.microsoft.com/office/drawing/2010/main" xmlns="" w="9525">
+              <a14:hiddenLine xmlns="" xmlns:a14="http://schemas.microsoft.com/office/drawing/2010/main" w="9525">
                 <a:solidFill>
                   <a:schemeClr val="tx1"/>
                 </a:solidFill>
@@ -12214,7 +13351,7 @@
           <a:blip r:embed="rId4">
             <a:extLst>
               <a:ext uri="{28A0092B-C50C-407E-A947-70E740481C1C}">
-                <a14:useLocalDpi xmlns:a14="http://schemas.microsoft.com/office/drawing/2010/main" xmlns="" val="0"/>
+                <a14:useLocalDpi xmlns="" xmlns:a14="http://schemas.microsoft.com/office/drawing/2010/main" val="0"/>
               </a:ext>
             </a:extLst>
           </a:blip>
@@ -12237,14 +13374,14 @@
           </a:ln>
           <a:extLst>
             <a:ext uri="{909E8E84-426E-40DD-AFC4-6F175D3DCCD1}">
-              <a14:hiddenFill xmlns:a14="http://schemas.microsoft.com/office/drawing/2010/main" xmlns="">
+              <a14:hiddenFill xmlns="" xmlns:a14="http://schemas.microsoft.com/office/drawing/2010/main">
                 <a:solidFill>
                   <a:schemeClr val="accent1"/>
                 </a:solidFill>
               </a14:hiddenFill>
             </a:ext>
             <a:ext uri="{91240B29-F687-4F45-9708-019B960494DF}">
-              <a14:hiddenLine xmlns:a14="http://schemas.microsoft.com/office/drawing/2010/main" xmlns="" w="9525">
+              <a14:hiddenLine xmlns="" xmlns:a14="http://schemas.microsoft.com/office/drawing/2010/main" w="9525">
                 <a:solidFill>
                   <a:schemeClr val="tx1"/>
                 </a:solidFill>
@@ -12259,7 +13396,7 @@
     </p:spTree>
     <p:extLst>
       <p:ext uri="{BB962C8B-B14F-4D97-AF65-F5344CB8AC3E}">
-        <p14:creationId xmlns:p14="http://schemas.microsoft.com/office/powerpoint/2010/main" xmlns="" val="3319510903"/>
+        <p14:creationId xmlns="" xmlns:p14="http://schemas.microsoft.com/office/powerpoint/2010/main" val="3319510903"/>
       </p:ext>
     </p:extLst>
   </p:cSld>
@@ -12383,7 +13520,7 @@
           <a:blip r:embed="rId2">
             <a:extLst>
               <a:ext uri="{28A0092B-C50C-407E-A947-70E740481C1C}">
-                <a14:useLocalDpi xmlns:a14="http://schemas.microsoft.com/office/drawing/2010/main" xmlns="" val="0"/>
+                <a14:useLocalDpi xmlns="" xmlns:a14="http://schemas.microsoft.com/office/drawing/2010/main" val="0"/>
               </a:ext>
             </a:extLst>
           </a:blip>
@@ -12406,14 +13543,14 @@
           </a:ln>
           <a:extLst>
             <a:ext uri="{909E8E84-426E-40DD-AFC4-6F175D3DCCD1}">
-              <a14:hiddenFill xmlns:a14="http://schemas.microsoft.com/office/drawing/2010/main" xmlns="">
+              <a14:hiddenFill xmlns="" xmlns:a14="http://schemas.microsoft.com/office/drawing/2010/main">
                 <a:solidFill>
                   <a:schemeClr val="accent1"/>
                 </a:solidFill>
               </a14:hiddenFill>
             </a:ext>
             <a:ext uri="{91240B29-F687-4F45-9708-019B960494DF}">
-              <a14:hiddenLine xmlns:a14="http://schemas.microsoft.com/office/drawing/2010/main" xmlns="" w="9525">
+              <a14:hiddenLine xmlns="" xmlns:a14="http://schemas.microsoft.com/office/drawing/2010/main" w="9525">
                 <a:solidFill>
                   <a:schemeClr val="tx1"/>
                 </a:solidFill>
@@ -12498,7 +13635,7 @@
           <a:blip r:embed="rId3">
             <a:extLst>
               <a:ext uri="{28A0092B-C50C-407E-A947-70E740481C1C}">
-                <a14:useLocalDpi xmlns:a14="http://schemas.microsoft.com/office/drawing/2010/main" xmlns="" val="0"/>
+                <a14:useLocalDpi xmlns="" xmlns:a14="http://schemas.microsoft.com/office/drawing/2010/main" val="0"/>
               </a:ext>
             </a:extLst>
           </a:blip>
@@ -12521,14 +13658,14 @@
           </a:ln>
           <a:extLst>
             <a:ext uri="{909E8E84-426E-40DD-AFC4-6F175D3DCCD1}">
-              <a14:hiddenFill xmlns:a14="http://schemas.microsoft.com/office/drawing/2010/main" xmlns="">
+              <a14:hiddenFill xmlns="" xmlns:a14="http://schemas.microsoft.com/office/drawing/2010/main">
                 <a:solidFill>
                   <a:schemeClr val="accent1"/>
                 </a:solidFill>
               </a14:hiddenFill>
             </a:ext>
             <a:ext uri="{91240B29-F687-4F45-9708-019B960494DF}">
-              <a14:hiddenLine xmlns:a14="http://schemas.microsoft.com/office/drawing/2010/main" xmlns="" w="9525">
+              <a14:hiddenLine xmlns="" xmlns:a14="http://schemas.microsoft.com/office/drawing/2010/main" w="9525">
                 <a:solidFill>
                   <a:schemeClr val="tx1"/>
                 </a:solidFill>
@@ -12552,7 +13689,7 @@
           <a:blip r:embed="rId4">
             <a:extLst>
               <a:ext uri="{28A0092B-C50C-407E-A947-70E740481C1C}">
-                <a14:useLocalDpi xmlns:a14="http://schemas.microsoft.com/office/drawing/2010/main" xmlns="" val="0"/>
+                <a14:useLocalDpi xmlns="" xmlns:a14="http://schemas.microsoft.com/office/drawing/2010/main" val="0"/>
               </a:ext>
             </a:extLst>
           </a:blip>
@@ -12575,14 +13712,14 @@
           </a:ln>
           <a:extLst>
             <a:ext uri="{909E8E84-426E-40DD-AFC4-6F175D3DCCD1}">
-              <a14:hiddenFill xmlns:a14="http://schemas.microsoft.com/office/drawing/2010/main" xmlns="">
+              <a14:hiddenFill xmlns="" xmlns:a14="http://schemas.microsoft.com/office/drawing/2010/main">
                 <a:solidFill>
                   <a:schemeClr val="accent1"/>
                 </a:solidFill>
               </a14:hiddenFill>
             </a:ext>
             <a:ext uri="{91240B29-F687-4F45-9708-019B960494DF}">
-              <a14:hiddenLine xmlns:a14="http://schemas.microsoft.com/office/drawing/2010/main" xmlns="" w="9525">
+              <a14:hiddenLine xmlns="" xmlns:a14="http://schemas.microsoft.com/office/drawing/2010/main" w="9525">
                 <a:solidFill>
                   <a:schemeClr val="tx1"/>
                 </a:solidFill>
@@ -12630,7 +13767,7 @@
     </p:spTree>
     <p:extLst>
       <p:ext uri="{BB962C8B-B14F-4D97-AF65-F5344CB8AC3E}">
-        <p14:creationId xmlns:p14="http://schemas.microsoft.com/office/powerpoint/2010/main" xmlns="" val="3708268009"/>
+        <p14:creationId xmlns="" xmlns:p14="http://schemas.microsoft.com/office/powerpoint/2010/main" val="3708268009"/>
       </p:ext>
     </p:extLst>
   </p:cSld>
@@ -12794,7 +13931,7 @@
           <a:blip r:embed="rId2">
             <a:extLst>
               <a:ext uri="{28A0092B-C50C-407E-A947-70E740481C1C}">
-                <a14:useLocalDpi xmlns:a14="http://schemas.microsoft.com/office/drawing/2010/main" xmlns="" val="0"/>
+                <a14:useLocalDpi xmlns="" xmlns:a14="http://schemas.microsoft.com/office/drawing/2010/main" val="0"/>
               </a:ext>
             </a:extLst>
           </a:blip>
@@ -12817,14 +13954,14 @@
           </a:ln>
           <a:extLst>
             <a:ext uri="{909E8E84-426E-40DD-AFC4-6F175D3DCCD1}">
-              <a14:hiddenFill xmlns:a14="http://schemas.microsoft.com/office/drawing/2010/main" xmlns="">
+              <a14:hiddenFill xmlns="" xmlns:a14="http://schemas.microsoft.com/office/drawing/2010/main">
                 <a:solidFill>
                   <a:schemeClr val="accent1"/>
                 </a:solidFill>
               </a14:hiddenFill>
             </a:ext>
             <a:ext uri="{91240B29-F687-4F45-9708-019B960494DF}">
-              <a14:hiddenLine xmlns:a14="http://schemas.microsoft.com/office/drawing/2010/main" xmlns="" w="9525">
+              <a14:hiddenLine xmlns="" xmlns:a14="http://schemas.microsoft.com/office/drawing/2010/main" w="9525">
                 <a:solidFill>
                   <a:schemeClr val="tx1"/>
                 </a:solidFill>
@@ -12839,7 +13976,7 @@
     </p:spTree>
     <p:extLst>
       <p:ext uri="{BB962C8B-B14F-4D97-AF65-F5344CB8AC3E}">
-        <p14:creationId xmlns:p14="http://schemas.microsoft.com/office/powerpoint/2010/main" xmlns="" val="674909081"/>
+        <p14:creationId xmlns="" xmlns:p14="http://schemas.microsoft.com/office/powerpoint/2010/main" val="674909081"/>
       </p:ext>
     </p:extLst>
   </p:cSld>

</xml_diff>